<commit_message>
updated image and text formatting for presentation
</commit_message>
<xml_diff>
--- a/ETF_Forecasts_Presentation.pptx
+++ b/ETF_Forecasts_Presentation.pptx
@@ -7854,7 +7854,16 @@
                 <a:cs typeface="Playfair Display Medium"/>
                 <a:sym typeface="Playfair Display Medium"/>
               </a:rPr>
-              <a:t>  Zun</a:t>
+              <a:t> </a:t>
+            </a:r>
+            <a:r>
+              <a:rPr b="0" lang="en" sz="3000">
+                <a:latin typeface="Playfair Display Medium"/>
+                <a:ea typeface="Playfair Display Medium"/>
+                <a:cs typeface="Playfair Display Medium"/>
+                <a:sym typeface="Playfair Display Medium"/>
+              </a:rPr>
+              <a:t> Zun</a:t>
             </a:r>
             <a:endParaRPr b="0" sz="3000">
               <a:latin typeface="Playfair Display Medium"/>
@@ -8049,8 +8058,8 @@
         </p:blipFill>
         <p:spPr>
           <a:xfrm>
-            <a:off x="41425" y="1847100"/>
-            <a:ext cx="4217149" cy="2108574"/>
+            <a:off x="0" y="1847100"/>
+            <a:ext cx="4282200" cy="2108574"/>
           </a:xfrm>
           <a:prstGeom prst="rect">
             <a:avLst/>
@@ -8077,8 +8086,8 @@
         </p:blipFill>
         <p:spPr>
           <a:xfrm>
-            <a:off x="4374300" y="1847100"/>
-            <a:ext cx="3814901" cy="2108574"/>
+            <a:off x="4364450" y="1847100"/>
+            <a:ext cx="3847826" cy="2108574"/>
           </a:xfrm>
           <a:prstGeom prst="rect">
             <a:avLst/>
@@ -8281,7 +8290,7 @@
         </p:blipFill>
         <p:spPr>
           <a:xfrm>
-            <a:off x="4829700" y="1166950"/>
+            <a:off x="4928438" y="1162312"/>
             <a:ext cx="2701451" cy="1350728"/>
           </a:xfrm>
           <a:prstGeom prst="rect">
@@ -8309,7 +8318,7 @@
         </p:blipFill>
         <p:spPr>
           <a:xfrm>
-            <a:off x="4829723" y="2498622"/>
+            <a:off x="4928460" y="2493984"/>
             <a:ext cx="2701421" cy="1350728"/>
           </a:xfrm>
           <a:prstGeom prst="rect">
@@ -8337,7 +8346,7 @@
         </p:blipFill>
         <p:spPr>
           <a:xfrm>
-            <a:off x="4829723" y="3797422"/>
+            <a:off x="4928461" y="3792784"/>
             <a:ext cx="2701451" cy="1350728"/>
           </a:xfrm>
           <a:prstGeom prst="rect">
@@ -8365,7 +8374,7 @@
         </p:blipFill>
         <p:spPr>
           <a:xfrm>
-            <a:off x="745058" y="1166950"/>
+            <a:off x="855471" y="1162313"/>
             <a:ext cx="2654093" cy="1327067"/>
           </a:xfrm>
           <a:prstGeom prst="rect">
@@ -8393,7 +8402,7 @@
         </p:blipFill>
         <p:spPr>
           <a:xfrm>
-            <a:off x="745058" y="2494017"/>
+            <a:off x="855471" y="2489379"/>
             <a:ext cx="2654107" cy="1327067"/>
           </a:xfrm>
           <a:prstGeom prst="rect">
@@ -8421,7 +8430,7 @@
         </p:blipFill>
         <p:spPr>
           <a:xfrm>
-            <a:off x="745050" y="3821083"/>
+            <a:off x="855463" y="3816446"/>
             <a:ext cx="2654107" cy="1327067"/>
           </a:xfrm>
           <a:prstGeom prst="rect">
@@ -8493,7 +8502,11 @@
             </a:pPr>
             <a:r>
               <a:rPr lang="en"/>
-              <a:t>Post </a:t>
+              <a:t>Post</a:t>
+            </a:r>
+            <a:r>
+              <a:rPr lang="en"/>
+              <a:t> </a:t>
             </a:r>
             <a:r>
               <a:rPr lang="en">
@@ -9089,8 +9102,8 @@
         </p:blipFill>
         <p:spPr>
           <a:xfrm>
-            <a:off x="6605975" y="4747250"/>
-            <a:ext cx="751675" cy="396250"/>
+            <a:off x="6828450" y="2861975"/>
+            <a:ext cx="1378399" cy="548224"/>
           </a:xfrm>
           <a:prstGeom prst="rect">
             <a:avLst/>
@@ -9214,8 +9227,8 @@
         </p:nvSpPr>
         <p:spPr>
           <a:xfrm>
-            <a:off x="1157225" y="-11950"/>
-            <a:ext cx="2222100" cy="1184400"/>
+            <a:off x="1018075" y="-520900"/>
+            <a:ext cx="3957300" cy="2202300"/>
           </a:xfrm>
           <a:prstGeom prst="rect">
             <a:avLst/>
@@ -9242,13 +9255,10 @@
               <a:t>Idea</a:t>
             </a:r>
             <a:r>
-              <a:rPr b="0" lang="en" sz="4800">
-                <a:solidFill>
-                  <a:srgbClr val="8AB4F8"/>
-                </a:solidFill>
-                <a:highlight>
-                  <a:schemeClr val="dk1"/>
-                </a:highlight>
+              <a:rPr b="0" lang="en" sz="7200">
+                <a:solidFill>
+                  <a:schemeClr val="lt1"/>
+                </a:solidFill>
                 <a:uFill>
                   <a:noFill/>
                 </a:uFill>
@@ -9266,13 +9276,10 @@
               </a:rPr>
               <a:t>💡</a:t>
             </a:r>
-            <a:endParaRPr sz="4800">
+            <a:endParaRPr sz="7200">
               <a:solidFill>
                 <a:schemeClr val="lt1"/>
               </a:solidFill>
-              <a:highlight>
-                <a:schemeClr val="dk1"/>
-              </a:highlight>
             </a:endParaRPr>
           </a:p>
         </p:txBody>
@@ -9293,9 +9300,7 @@
           <a:prstGeom prst="rect">
             <a:avLst/>
           </a:prstGeom>
-          <a:solidFill>
-            <a:schemeClr val="dk1"/>
-          </a:solidFill>
+          <a:noFill/>
         </p:spPr>
         <p:txBody>
           <a:bodyPr anchorCtr="0" anchor="ctr" bIns="91425" lIns="91425" spcFirstLastPara="1" rIns="91425" wrap="square" tIns="91425">
@@ -10252,8 +10257,8 @@
         </p:blipFill>
         <p:spPr>
           <a:xfrm>
-            <a:off x="564225" y="3020775"/>
-            <a:ext cx="1444601" cy="764424"/>
+            <a:off x="2072456" y="4085575"/>
+            <a:ext cx="2203469" cy="1094575"/>
           </a:xfrm>
           <a:prstGeom prst="rect">
             <a:avLst/>
@@ -10280,8 +10285,8 @@
         </p:blipFill>
         <p:spPr>
           <a:xfrm>
-            <a:off x="1136725" y="3785201"/>
-            <a:ext cx="1483675" cy="775825"/>
+            <a:off x="0" y="4085575"/>
+            <a:ext cx="2093210" cy="1094575"/>
           </a:xfrm>
           <a:prstGeom prst="rect">
             <a:avLst/>
@@ -10308,8 +10313,8 @@
         </p:blipFill>
         <p:spPr>
           <a:xfrm>
-            <a:off x="1919613" y="4353125"/>
-            <a:ext cx="1483674" cy="697400"/>
+            <a:off x="0" y="3027675"/>
+            <a:ext cx="4275924" cy="1057900"/>
           </a:xfrm>
           <a:prstGeom prst="rect">
             <a:avLst/>
@@ -10882,8 +10887,8 @@
         </p:blipFill>
         <p:spPr>
           <a:xfrm>
-            <a:off x="583925" y="3917675"/>
-            <a:ext cx="2795400" cy="1091225"/>
+            <a:off x="0" y="3372600"/>
+            <a:ext cx="4282200" cy="1671612"/>
           </a:xfrm>
           <a:prstGeom prst="rect">
             <a:avLst/>
@@ -10910,8 +10915,8 @@
         </p:blipFill>
         <p:spPr>
           <a:xfrm>
-            <a:off x="4530625" y="3874125"/>
-            <a:ext cx="3478675" cy="1049475"/>
+            <a:off x="4350450" y="3605975"/>
+            <a:ext cx="3896900" cy="1153100"/>
           </a:xfrm>
           <a:prstGeom prst="rect">
             <a:avLst/>
@@ -10938,9 +10943,7 @@
           <a:prstGeom prst="rect">
             <a:avLst/>
           </a:prstGeom>
-          <a:solidFill>
-            <a:schemeClr val="dk1"/>
-          </a:solidFill>
+          <a:noFill/>
         </p:spPr>
         <p:txBody>
           <a:bodyPr anchorCtr="0" anchor="ctr" bIns="91425" lIns="91425" spcFirstLastPara="1" rIns="91425" wrap="square" tIns="91425">
@@ -11793,8 +11796,8 @@
         </p:blipFill>
         <p:spPr>
           <a:xfrm>
-            <a:off x="712562" y="4038188"/>
-            <a:ext cx="2500877" cy="1031600"/>
+            <a:off x="0" y="3985100"/>
+            <a:ext cx="4275924" cy="1168550"/>
           </a:xfrm>
           <a:prstGeom prst="rect">
             <a:avLst/>
@@ -12682,7 +12685,7 @@
         </p:nvSpPr>
         <p:spPr>
           <a:xfrm>
-            <a:off x="2322175" y="-82800"/>
+            <a:off x="1842725" y="-100500"/>
             <a:ext cx="4809300" cy="989700"/>
           </a:xfrm>
           <a:prstGeom prst="rect">
@@ -12707,7 +12710,7 @@
             </a:pPr>
             <a:r>
               <a:rPr lang="en"/>
-              <a:t>Eval </a:t>
+              <a:t>Evalu</a:t>
             </a:r>
             <a:r>
               <a:rPr lang="en">
@@ -12715,7 +12718,7 @@
                   <a:schemeClr val="lt1"/>
                 </a:solidFill>
               </a:rPr>
-              <a:t>uation</a:t>
+              <a:t> ation</a:t>
             </a:r>
             <a:endParaRPr>
               <a:solidFill>
@@ -12947,7 +12950,7 @@
         </p:nvSpPr>
         <p:spPr>
           <a:xfrm>
-            <a:off x="3114950" y="3680000"/>
+            <a:off x="3114950" y="3641250"/>
             <a:ext cx="2776500" cy="343800"/>
           </a:xfrm>
           <a:prstGeom prst="rect">
@@ -13010,8 +13013,8 @@
         </p:blipFill>
         <p:spPr>
           <a:xfrm>
-            <a:off x="397675" y="1245350"/>
-            <a:ext cx="2327651" cy="1163809"/>
+            <a:off x="397675" y="1165632"/>
+            <a:ext cx="2375970" cy="1187968"/>
           </a:xfrm>
           <a:prstGeom prst="rect">
             <a:avLst/>
@@ -13038,8 +13041,8 @@
         </p:blipFill>
         <p:spPr>
           <a:xfrm>
-            <a:off x="397675" y="2578381"/>
-            <a:ext cx="2327651" cy="1163820"/>
+            <a:off x="397675" y="2526335"/>
+            <a:ext cx="2375970" cy="1187979"/>
           </a:xfrm>
           <a:prstGeom prst="rect">
             <a:avLst/>
@@ -13066,8 +13069,8 @@
         </p:blipFill>
         <p:spPr>
           <a:xfrm>
-            <a:off x="397688" y="3911425"/>
-            <a:ext cx="2327621" cy="1163799"/>
+            <a:off x="397688" y="3887053"/>
+            <a:ext cx="2375940" cy="1187959"/>
           </a:xfrm>
           <a:prstGeom prst="rect">
             <a:avLst/>
@@ -13094,8 +13097,8 @@
         </p:blipFill>
         <p:spPr>
           <a:xfrm>
-            <a:off x="5549450" y="1235375"/>
-            <a:ext cx="2327651" cy="1163826"/>
+            <a:off x="5580194" y="1155450"/>
+            <a:ext cx="2375970" cy="1187985"/>
           </a:xfrm>
           <a:prstGeom prst="rect">
             <a:avLst/>
@@ -13122,8 +13125,8 @@
         </p:blipFill>
         <p:spPr>
           <a:xfrm>
-            <a:off x="5534525" y="2578375"/>
-            <a:ext cx="2327670" cy="1163826"/>
+            <a:off x="5564960" y="2526330"/>
+            <a:ext cx="2375989" cy="1187985"/>
           </a:xfrm>
           <a:prstGeom prst="rect">
             <a:avLst/>
@@ -13150,8 +13153,8 @@
         </p:blipFill>
         <p:spPr>
           <a:xfrm>
-            <a:off x="5534525" y="3921725"/>
-            <a:ext cx="2327599" cy="1163799"/>
+            <a:off x="5564960" y="3897566"/>
+            <a:ext cx="2375917" cy="1187959"/>
           </a:xfrm>
           <a:prstGeom prst="rect">
             <a:avLst/>
@@ -13172,7 +13175,7 @@
         </p:nvSpPr>
         <p:spPr>
           <a:xfrm>
-            <a:off x="2725325" y="1318050"/>
+            <a:off x="2725325" y="1241275"/>
             <a:ext cx="1233900" cy="1091100"/>
           </a:xfrm>
           <a:prstGeom prst="rect">
@@ -13245,7 +13248,7 @@
         </p:nvSpPr>
         <p:spPr>
           <a:xfrm>
-            <a:off x="2725325" y="2613450"/>
+            <a:off x="2725325" y="2536675"/>
             <a:ext cx="1324800" cy="1091100"/>
           </a:xfrm>
           <a:prstGeom prst="rect">
@@ -13330,7 +13333,7 @@
         </p:nvSpPr>
         <p:spPr>
           <a:xfrm>
-            <a:off x="2725325" y="3985050"/>
+            <a:off x="2725325" y="3908275"/>
             <a:ext cx="1233900" cy="1091100"/>
           </a:xfrm>
           <a:prstGeom prst="rect">
@@ -13415,7 +13418,7 @@
         </p:nvSpPr>
         <p:spPr>
           <a:xfrm>
-            <a:off x="4401725" y="1318050"/>
+            <a:off x="4428950" y="1241275"/>
             <a:ext cx="1233900" cy="1091100"/>
           </a:xfrm>
           <a:prstGeom prst="rect">
@@ -13512,7 +13515,7 @@
         </p:nvSpPr>
         <p:spPr>
           <a:xfrm>
-            <a:off x="4401725" y="2614913"/>
+            <a:off x="4428950" y="2538138"/>
             <a:ext cx="1233900" cy="1091100"/>
           </a:xfrm>
           <a:prstGeom prst="rect">
@@ -13609,7 +13612,7 @@
         </p:nvSpPr>
         <p:spPr>
           <a:xfrm>
-            <a:off x="4401725" y="3985050"/>
+            <a:off x="4428950" y="3908275"/>
             <a:ext cx="1233900" cy="1091100"/>
           </a:xfrm>
           <a:prstGeom prst="rect">
@@ -13705,6 +13708,285 @@
 </file>
 
 <file path=ppt/theme/theme1.xml><?xml version="1.0" encoding="utf-8"?>
+<a:theme xmlns:a="http://schemas.openxmlformats.org/drawingml/2006/main" xmlns:r="http://schemas.openxmlformats.org/officeDocument/2006/relationships" name="Pop">
+  <a:themeElements>
+    <a:clrScheme name="Pop">
+      <a:dk1>
+        <a:srgbClr val="F8E71C"/>
+      </a:dk1>
+      <a:lt1>
+        <a:srgbClr val="FFFFFF"/>
+      </a:lt1>
+      <a:dk2>
+        <a:srgbClr val="000000"/>
+      </a:dk2>
+      <a:lt2>
+        <a:srgbClr val="D9D9D9"/>
+      </a:lt2>
+      <a:accent1>
+        <a:srgbClr val="666666"/>
+      </a:accent1>
+      <a:accent2>
+        <a:srgbClr val="483165"/>
+      </a:accent2>
+      <a:accent3>
+        <a:srgbClr val="EB1E95"/>
+      </a:accent3>
+      <a:accent4>
+        <a:srgbClr val="01AFD1"/>
+      </a:accent4>
+      <a:accent5>
+        <a:srgbClr val="0F9D58"/>
+      </a:accent5>
+      <a:accent6>
+        <a:srgbClr val="9C27B0"/>
+      </a:accent6>
+      <a:hlink>
+        <a:srgbClr val="0F9D58"/>
+      </a:hlink>
+      <a:folHlink>
+        <a:srgbClr val="0F9D58"/>
+      </a:folHlink>
+    </a:clrScheme>
+    <a:fontScheme name="Office">
+      <a:majorFont>
+        <a:latin typeface="Arial"/>
+        <a:ea typeface=""/>
+        <a:cs typeface=""/>
+        <a:font script="Jpan" typeface="ＭＳ Ｐゴシック"/>
+        <a:font script="Hang" typeface="맑은 고딕"/>
+        <a:font script="Hans" typeface="宋体"/>
+        <a:font script="Hant" typeface="新細明體"/>
+        <a:font script="Arab" typeface="Times New Roman"/>
+        <a:font script="Hebr" typeface="Times New Roman"/>
+        <a:font script="Thai" typeface="Angsana New"/>
+        <a:font script="Ethi" typeface="Nyala"/>
+        <a:font script="Beng" typeface="Vrinda"/>
+        <a:font script="Gujr" typeface="Shruti"/>
+        <a:font script="Khmr" typeface="MoolBoran"/>
+        <a:font script="Knda" typeface="Tunga"/>
+        <a:font script="Guru" typeface="Raavi"/>
+        <a:font script="Cans" typeface="Euphemia"/>
+        <a:font script="Cher" typeface="Plantagenet Cherokee"/>
+        <a:font script="Yiii" typeface="Microsoft Yi Baiti"/>
+        <a:font script="Tibt" typeface="Microsoft Himalaya"/>
+        <a:font script="Thaa" typeface="MV Boli"/>
+        <a:font script="Deva" typeface="Mangal"/>
+        <a:font script="Telu" typeface="Gautami"/>
+        <a:font script="Taml" typeface="Latha"/>
+        <a:font script="Syrc" typeface="Estrangelo Edessa"/>
+        <a:font script="Orya" typeface="Kalinga"/>
+        <a:font script="Mlym" typeface="Kartika"/>
+        <a:font script="Laoo" typeface="DokChampa"/>
+        <a:font script="Sinh" typeface="Iskoola Pota"/>
+        <a:font script="Mong" typeface="Mongolian Baiti"/>
+        <a:font script="Viet" typeface="Times New Roman"/>
+        <a:font script="Uigh" typeface="Microsoft Uighur"/>
+        <a:font script="Geor" typeface="Sylfaen"/>
+      </a:majorFont>
+      <a:minorFont>
+        <a:latin typeface="Arial"/>
+        <a:ea typeface=""/>
+        <a:cs typeface=""/>
+        <a:font script="Jpan" typeface="ＭＳ Ｐゴシック"/>
+        <a:font script="Hang" typeface="맑은 고딕"/>
+        <a:font script="Hans" typeface="宋体"/>
+        <a:font script="Hant" typeface="新細明體"/>
+        <a:font script="Arab" typeface="Arial"/>
+        <a:font script="Hebr" typeface="Arial"/>
+        <a:font script="Thai" typeface="Cordia New"/>
+        <a:font script="Ethi" typeface="Nyala"/>
+        <a:font script="Beng" typeface="Vrinda"/>
+        <a:font script="Gujr" typeface="Shruti"/>
+        <a:font script="Khmr" typeface="DaunPenh"/>
+        <a:font script="Knda" typeface="Tunga"/>
+        <a:font script="Guru" typeface="Raavi"/>
+        <a:font script="Cans" typeface="Euphemia"/>
+        <a:font script="Cher" typeface="Plantagenet Cherokee"/>
+        <a:font script="Yiii" typeface="Microsoft Yi Baiti"/>
+        <a:font script="Tibt" typeface="Microsoft Himalaya"/>
+        <a:font script="Thaa" typeface="MV Boli"/>
+        <a:font script="Deva" typeface="Mangal"/>
+        <a:font script="Telu" typeface="Gautami"/>
+        <a:font script="Taml" typeface="Latha"/>
+        <a:font script="Syrc" typeface="Estrangelo Edessa"/>
+        <a:font script="Orya" typeface="Kalinga"/>
+        <a:font script="Mlym" typeface="Kartika"/>
+        <a:font script="Laoo" typeface="DokChampa"/>
+        <a:font script="Sinh" typeface="Iskoola Pota"/>
+        <a:font script="Mong" typeface="Mongolian Baiti"/>
+        <a:font script="Viet" typeface="Arial"/>
+        <a:font script="Uigh" typeface="Microsoft Uighur"/>
+        <a:font script="Geor" typeface="Sylfaen"/>
+      </a:minorFont>
+    </a:fontScheme>
+    <a:fmtScheme name="Office">
+      <a:fillStyleLst>
+        <a:solidFill>
+          <a:schemeClr val="phClr"/>
+        </a:solidFill>
+        <a:gradFill rotWithShape="1">
+          <a:gsLst>
+            <a:gs pos="0">
+              <a:schemeClr val="phClr">
+                <a:tint val="50000"/>
+                <a:satMod val="300000"/>
+              </a:schemeClr>
+            </a:gs>
+            <a:gs pos="35000">
+              <a:schemeClr val="phClr">
+                <a:tint val="37000"/>
+                <a:satMod val="300000"/>
+              </a:schemeClr>
+            </a:gs>
+            <a:gs pos="100000">
+              <a:schemeClr val="phClr">
+                <a:tint val="15000"/>
+                <a:satMod val="350000"/>
+              </a:schemeClr>
+            </a:gs>
+          </a:gsLst>
+          <a:lin ang="16200000" scaled="1"/>
+        </a:gradFill>
+        <a:gradFill rotWithShape="1">
+          <a:gsLst>
+            <a:gs pos="0">
+              <a:schemeClr val="phClr">
+                <a:tint val="100000"/>
+                <a:shade val="100000"/>
+                <a:satMod val="130000"/>
+              </a:schemeClr>
+            </a:gs>
+            <a:gs pos="100000">
+              <a:schemeClr val="phClr">
+                <a:tint val="50000"/>
+                <a:shade val="100000"/>
+                <a:satMod val="350000"/>
+              </a:schemeClr>
+            </a:gs>
+          </a:gsLst>
+          <a:lin ang="16200000" scaled="0"/>
+        </a:gradFill>
+      </a:fillStyleLst>
+      <a:lnStyleLst>
+        <a:ln w="9525" cap="flat" cmpd="sng" algn="ctr">
+          <a:solidFill>
+            <a:schemeClr val="phClr">
+              <a:shade val="95000"/>
+              <a:satMod val="105000"/>
+            </a:schemeClr>
+          </a:solidFill>
+          <a:prstDash val="solid"/>
+        </a:ln>
+        <a:ln w="25400" cap="flat" cmpd="sng" algn="ctr">
+          <a:solidFill>
+            <a:schemeClr val="phClr"/>
+          </a:solidFill>
+          <a:prstDash val="solid"/>
+        </a:ln>
+        <a:ln w="38100" cap="flat" cmpd="sng" algn="ctr">
+          <a:solidFill>
+            <a:schemeClr val="phClr"/>
+          </a:solidFill>
+          <a:prstDash val="solid"/>
+        </a:ln>
+      </a:lnStyleLst>
+      <a:effectStyleLst>
+        <a:effectStyle>
+          <a:effectLst>
+            <a:outerShdw blurRad="40000" dist="20000" dir="5400000" rotWithShape="0">
+              <a:srgbClr val="000000">
+                <a:alpha val="38000"/>
+              </a:srgbClr>
+            </a:outerShdw>
+          </a:effectLst>
+        </a:effectStyle>
+        <a:effectStyle>
+          <a:effectLst>
+            <a:outerShdw blurRad="40000" dist="23000" dir="5400000" rotWithShape="0">
+              <a:srgbClr val="000000">
+                <a:alpha val="35000"/>
+              </a:srgbClr>
+            </a:outerShdw>
+          </a:effectLst>
+        </a:effectStyle>
+        <a:effectStyle>
+          <a:effectLst>
+            <a:outerShdw blurRad="40000" dist="23000" dir="5400000" rotWithShape="0">
+              <a:srgbClr val="000000">
+                <a:alpha val="35000"/>
+              </a:srgbClr>
+            </a:outerShdw>
+          </a:effectLst>
+          <a:scene3d>
+            <a:camera prst="orthographicFront">
+              <a:rot lat="0" lon="0" rev="0"/>
+            </a:camera>
+            <a:lightRig rig="threePt" dir="t">
+              <a:rot lat="0" lon="0" rev="1200000"/>
+            </a:lightRig>
+          </a:scene3d>
+          <a:sp3d>
+            <a:bevelT w="63500" h="25400"/>
+          </a:sp3d>
+        </a:effectStyle>
+      </a:effectStyleLst>
+      <a:bgFillStyleLst>
+        <a:solidFill>
+          <a:schemeClr val="phClr"/>
+        </a:solidFill>
+        <a:gradFill rotWithShape="1">
+          <a:gsLst>
+            <a:gs pos="0">
+              <a:schemeClr val="phClr">
+                <a:tint val="40000"/>
+                <a:satMod val="350000"/>
+              </a:schemeClr>
+            </a:gs>
+            <a:gs pos="40000">
+              <a:schemeClr val="phClr">
+                <a:tint val="45000"/>
+                <a:shade val="99000"/>
+                <a:satMod val="350000"/>
+              </a:schemeClr>
+            </a:gs>
+            <a:gs pos="100000">
+              <a:schemeClr val="phClr">
+                <a:shade val="20000"/>
+                <a:satMod val="255000"/>
+              </a:schemeClr>
+            </a:gs>
+          </a:gsLst>
+          <a:path path="circle">
+            <a:fillToRect l="50000" t="-80000" r="50000" b="180000"/>
+          </a:path>
+        </a:gradFill>
+        <a:gradFill rotWithShape="1">
+          <a:gsLst>
+            <a:gs pos="0">
+              <a:schemeClr val="phClr">
+                <a:tint val="80000"/>
+                <a:satMod val="300000"/>
+              </a:schemeClr>
+            </a:gs>
+            <a:gs pos="100000">
+              <a:schemeClr val="phClr">
+                <a:shade val="30000"/>
+                <a:satMod val="200000"/>
+              </a:schemeClr>
+            </a:gs>
+          </a:gsLst>
+          <a:path path="circle">
+            <a:fillToRect l="50000" t="50000" r="50000" b="50000"/>
+          </a:path>
+        </a:gradFill>
+      </a:bgFillStyleLst>
+    </a:fmtScheme>
+  </a:themeElements>
+</a:theme>
+</file>
+
+<file path=ppt/theme/theme2.xml><?xml version="1.0" encoding="utf-8"?>
 <a:theme xmlns:a="http://schemas.openxmlformats.org/drawingml/2006/main" xmlns:r="http://schemas.openxmlformats.org/officeDocument/2006/relationships">
   <a:themeElements>
     <a:clrScheme name="Default">
@@ -13981,283 +14263,4 @@
     </a:fmtScheme>
   </a:themeElements>
 </a:theme>
-</file>
-
-<file path=ppt/theme/theme2.xml><?xml version="1.0" encoding="utf-8"?>
-<a:theme xmlns:a="http://schemas.openxmlformats.org/drawingml/2006/main" xmlns:r="http://schemas.openxmlformats.org/officeDocument/2006/relationships" name="Pop">
-  <a:themeElements>
-    <a:clrScheme name="Pop">
-      <a:dk1>
-        <a:srgbClr val="F8E71C"/>
-      </a:dk1>
-      <a:lt1>
-        <a:srgbClr val="FFFFFF"/>
-      </a:lt1>
-      <a:dk2>
-        <a:srgbClr val="000000"/>
-      </a:dk2>
-      <a:lt2>
-        <a:srgbClr val="D9D9D9"/>
-      </a:lt2>
-      <a:accent1>
-        <a:srgbClr val="666666"/>
-      </a:accent1>
-      <a:accent2>
-        <a:srgbClr val="483165"/>
-      </a:accent2>
-      <a:accent3>
-        <a:srgbClr val="EB1E95"/>
-      </a:accent3>
-      <a:accent4>
-        <a:srgbClr val="01AFD1"/>
-      </a:accent4>
-      <a:accent5>
-        <a:srgbClr val="0F9D58"/>
-      </a:accent5>
-      <a:accent6>
-        <a:srgbClr val="9C27B0"/>
-      </a:accent6>
-      <a:hlink>
-        <a:srgbClr val="0F9D58"/>
-      </a:hlink>
-      <a:folHlink>
-        <a:srgbClr val="0F9D58"/>
-      </a:folHlink>
-    </a:clrScheme>
-    <a:fontScheme name="Office">
-      <a:majorFont>
-        <a:latin typeface="Arial"/>
-        <a:ea typeface=""/>
-        <a:cs typeface=""/>
-        <a:font script="Jpan" typeface="ＭＳ Ｐゴシック"/>
-        <a:font script="Hang" typeface="맑은 고딕"/>
-        <a:font script="Hans" typeface="宋体"/>
-        <a:font script="Hant" typeface="新細明體"/>
-        <a:font script="Arab" typeface="Times New Roman"/>
-        <a:font script="Hebr" typeface="Times New Roman"/>
-        <a:font script="Thai" typeface="Angsana New"/>
-        <a:font script="Ethi" typeface="Nyala"/>
-        <a:font script="Beng" typeface="Vrinda"/>
-        <a:font script="Gujr" typeface="Shruti"/>
-        <a:font script="Khmr" typeface="MoolBoran"/>
-        <a:font script="Knda" typeface="Tunga"/>
-        <a:font script="Guru" typeface="Raavi"/>
-        <a:font script="Cans" typeface="Euphemia"/>
-        <a:font script="Cher" typeface="Plantagenet Cherokee"/>
-        <a:font script="Yiii" typeface="Microsoft Yi Baiti"/>
-        <a:font script="Tibt" typeface="Microsoft Himalaya"/>
-        <a:font script="Thaa" typeface="MV Boli"/>
-        <a:font script="Deva" typeface="Mangal"/>
-        <a:font script="Telu" typeface="Gautami"/>
-        <a:font script="Taml" typeface="Latha"/>
-        <a:font script="Syrc" typeface="Estrangelo Edessa"/>
-        <a:font script="Orya" typeface="Kalinga"/>
-        <a:font script="Mlym" typeface="Kartika"/>
-        <a:font script="Laoo" typeface="DokChampa"/>
-        <a:font script="Sinh" typeface="Iskoola Pota"/>
-        <a:font script="Mong" typeface="Mongolian Baiti"/>
-        <a:font script="Viet" typeface="Times New Roman"/>
-        <a:font script="Uigh" typeface="Microsoft Uighur"/>
-        <a:font script="Geor" typeface="Sylfaen"/>
-      </a:majorFont>
-      <a:minorFont>
-        <a:latin typeface="Arial"/>
-        <a:ea typeface=""/>
-        <a:cs typeface=""/>
-        <a:font script="Jpan" typeface="ＭＳ Ｐゴシック"/>
-        <a:font script="Hang" typeface="맑은 고딕"/>
-        <a:font script="Hans" typeface="宋体"/>
-        <a:font script="Hant" typeface="新細明體"/>
-        <a:font script="Arab" typeface="Arial"/>
-        <a:font script="Hebr" typeface="Arial"/>
-        <a:font script="Thai" typeface="Cordia New"/>
-        <a:font script="Ethi" typeface="Nyala"/>
-        <a:font script="Beng" typeface="Vrinda"/>
-        <a:font script="Gujr" typeface="Shruti"/>
-        <a:font script="Khmr" typeface="DaunPenh"/>
-        <a:font script="Knda" typeface="Tunga"/>
-        <a:font script="Guru" typeface="Raavi"/>
-        <a:font script="Cans" typeface="Euphemia"/>
-        <a:font script="Cher" typeface="Plantagenet Cherokee"/>
-        <a:font script="Yiii" typeface="Microsoft Yi Baiti"/>
-        <a:font script="Tibt" typeface="Microsoft Himalaya"/>
-        <a:font script="Thaa" typeface="MV Boli"/>
-        <a:font script="Deva" typeface="Mangal"/>
-        <a:font script="Telu" typeface="Gautami"/>
-        <a:font script="Taml" typeface="Latha"/>
-        <a:font script="Syrc" typeface="Estrangelo Edessa"/>
-        <a:font script="Orya" typeface="Kalinga"/>
-        <a:font script="Mlym" typeface="Kartika"/>
-        <a:font script="Laoo" typeface="DokChampa"/>
-        <a:font script="Sinh" typeface="Iskoola Pota"/>
-        <a:font script="Mong" typeface="Mongolian Baiti"/>
-        <a:font script="Viet" typeface="Arial"/>
-        <a:font script="Uigh" typeface="Microsoft Uighur"/>
-        <a:font script="Geor" typeface="Sylfaen"/>
-      </a:minorFont>
-    </a:fontScheme>
-    <a:fmtScheme name="Office">
-      <a:fillStyleLst>
-        <a:solidFill>
-          <a:schemeClr val="phClr"/>
-        </a:solidFill>
-        <a:gradFill rotWithShape="1">
-          <a:gsLst>
-            <a:gs pos="0">
-              <a:schemeClr val="phClr">
-                <a:tint val="50000"/>
-                <a:satMod val="300000"/>
-              </a:schemeClr>
-            </a:gs>
-            <a:gs pos="35000">
-              <a:schemeClr val="phClr">
-                <a:tint val="37000"/>
-                <a:satMod val="300000"/>
-              </a:schemeClr>
-            </a:gs>
-            <a:gs pos="100000">
-              <a:schemeClr val="phClr">
-                <a:tint val="15000"/>
-                <a:satMod val="350000"/>
-              </a:schemeClr>
-            </a:gs>
-          </a:gsLst>
-          <a:lin ang="16200000" scaled="1"/>
-        </a:gradFill>
-        <a:gradFill rotWithShape="1">
-          <a:gsLst>
-            <a:gs pos="0">
-              <a:schemeClr val="phClr">
-                <a:tint val="100000"/>
-                <a:shade val="100000"/>
-                <a:satMod val="130000"/>
-              </a:schemeClr>
-            </a:gs>
-            <a:gs pos="100000">
-              <a:schemeClr val="phClr">
-                <a:tint val="50000"/>
-                <a:shade val="100000"/>
-                <a:satMod val="350000"/>
-              </a:schemeClr>
-            </a:gs>
-          </a:gsLst>
-          <a:lin ang="16200000" scaled="0"/>
-        </a:gradFill>
-      </a:fillStyleLst>
-      <a:lnStyleLst>
-        <a:ln w="9525" cap="flat" cmpd="sng" algn="ctr">
-          <a:solidFill>
-            <a:schemeClr val="phClr">
-              <a:shade val="95000"/>
-              <a:satMod val="105000"/>
-            </a:schemeClr>
-          </a:solidFill>
-          <a:prstDash val="solid"/>
-        </a:ln>
-        <a:ln w="25400" cap="flat" cmpd="sng" algn="ctr">
-          <a:solidFill>
-            <a:schemeClr val="phClr"/>
-          </a:solidFill>
-          <a:prstDash val="solid"/>
-        </a:ln>
-        <a:ln w="38100" cap="flat" cmpd="sng" algn="ctr">
-          <a:solidFill>
-            <a:schemeClr val="phClr"/>
-          </a:solidFill>
-          <a:prstDash val="solid"/>
-        </a:ln>
-      </a:lnStyleLst>
-      <a:effectStyleLst>
-        <a:effectStyle>
-          <a:effectLst>
-            <a:outerShdw blurRad="40000" dist="20000" dir="5400000" rotWithShape="0">
-              <a:srgbClr val="000000">
-                <a:alpha val="38000"/>
-              </a:srgbClr>
-            </a:outerShdw>
-          </a:effectLst>
-        </a:effectStyle>
-        <a:effectStyle>
-          <a:effectLst>
-            <a:outerShdw blurRad="40000" dist="23000" dir="5400000" rotWithShape="0">
-              <a:srgbClr val="000000">
-                <a:alpha val="35000"/>
-              </a:srgbClr>
-            </a:outerShdw>
-          </a:effectLst>
-        </a:effectStyle>
-        <a:effectStyle>
-          <a:effectLst>
-            <a:outerShdw blurRad="40000" dist="23000" dir="5400000" rotWithShape="0">
-              <a:srgbClr val="000000">
-                <a:alpha val="35000"/>
-              </a:srgbClr>
-            </a:outerShdw>
-          </a:effectLst>
-          <a:scene3d>
-            <a:camera prst="orthographicFront">
-              <a:rot lat="0" lon="0" rev="0"/>
-            </a:camera>
-            <a:lightRig rig="threePt" dir="t">
-              <a:rot lat="0" lon="0" rev="1200000"/>
-            </a:lightRig>
-          </a:scene3d>
-          <a:sp3d>
-            <a:bevelT w="63500" h="25400"/>
-          </a:sp3d>
-        </a:effectStyle>
-      </a:effectStyleLst>
-      <a:bgFillStyleLst>
-        <a:solidFill>
-          <a:schemeClr val="phClr"/>
-        </a:solidFill>
-        <a:gradFill rotWithShape="1">
-          <a:gsLst>
-            <a:gs pos="0">
-              <a:schemeClr val="phClr">
-                <a:tint val="40000"/>
-                <a:satMod val="350000"/>
-              </a:schemeClr>
-            </a:gs>
-            <a:gs pos="40000">
-              <a:schemeClr val="phClr">
-                <a:tint val="45000"/>
-                <a:shade val="99000"/>
-                <a:satMod val="350000"/>
-              </a:schemeClr>
-            </a:gs>
-            <a:gs pos="100000">
-              <a:schemeClr val="phClr">
-                <a:shade val="20000"/>
-                <a:satMod val="255000"/>
-              </a:schemeClr>
-            </a:gs>
-          </a:gsLst>
-          <a:path path="circle">
-            <a:fillToRect l="50000" t="-80000" r="50000" b="180000"/>
-          </a:path>
-        </a:gradFill>
-        <a:gradFill rotWithShape="1">
-          <a:gsLst>
-            <a:gs pos="0">
-              <a:schemeClr val="phClr">
-                <a:tint val="80000"/>
-                <a:satMod val="300000"/>
-              </a:schemeClr>
-            </a:gs>
-            <a:gs pos="100000">
-              <a:schemeClr val="phClr">
-                <a:shade val="30000"/>
-                <a:satMod val="200000"/>
-              </a:schemeClr>
-            </a:gs>
-          </a:gsLst>
-          <a:path path="circle">
-            <a:fillToRect l="50000" t="50000" r="50000" b="50000"/>
-          </a:path>
-        </a:gradFill>
-      </a:bgFillStyleLst>
-    </a:fmtScheme>
-  </a:themeElements>
-</a:theme>
 </file>
</xml_diff>